<commit_message>
fix: remove fabricated data, clear language, add migration section
</commit_message>
<xml_diff>
--- a/client-offering.pptx
+++ b/client-offering.pptx
@@ -10330,7 +10330,7 @@
                 <a:ea typeface="Calibri" pitchFamily="34" charset="-122"/>
                 <a:cs typeface="Calibri" pitchFamily="34" charset="-120"/>
               </a:rPr>
-              <a:t>Recognized by ISG Provider Lens® as Leader in both Agentic AI and Generative AI Services — two consecutive years.</a:t>
+              <a:t>Recognized by ISG Provider Lens® as Leader in both Agentic AI and Generative AI Services.</a:t>
             </a:r>
             <a:endParaRPr lang="en-US" sz="900" dirty="0"/>
           </a:p>
@@ -10589,7 +10589,7 @@
                 <a:ea typeface="Calibri" pitchFamily="34" charset="-122"/>
                 <a:cs typeface="Calibri" pitchFamily="34" charset="-120"/>
               </a:rPr>
-              <a:t>10,000+ D&amp;A Professionals</a:t>
+              <a:t>Global Scale, Local Expertise</a:t>
             </a:r>
             <a:endParaRPr lang="en-US" sz="1200" dirty="0"/>
           </a:p>
@@ -10628,7 +10628,7 @@
                 <a:ea typeface="Calibri" pitchFamily="34" charset="-122"/>
                 <a:cs typeface="Calibri" pitchFamily="34" charset="-120"/>
               </a:rPr>
-              <a:t>Global scale across 35+ countries with deep local expertise in your sector and region.</a:t>
+              <a:t>$30B+ organization with ~200,000 employees across 70+ countries. Deep local expertise in your sector and region.</a:t>
             </a:r>
             <a:endParaRPr lang="en-US" sz="900" dirty="0"/>
           </a:p>

</xml_diff>